<commit_message>
Update Poster PDF and PPTX
</commit_message>
<xml_diff>
--- a/CS5331_Poster.pptx
+++ b/CS5331_Poster.pptx
@@ -260,7 +260,7 @@
           </ac:graphicFrameMkLst>
         </pc:graphicFrameChg>
         <pc:graphicFrameChg chg="add del mod modGraphic">
-          <ac:chgData name="Daryl Quek" userId="f27e3362e4192b30" providerId="LiveId" clId="{EABF0CBF-A883-4410-8F6F-DAEAA6E8CC01}" dt="2018-11-26T14:59:18.809" v="3661"/>
+          <ac:chgData name="Daryl Quek" userId="f27e3362e4192b30" providerId="LiveId" clId="{EABF0CBF-A883-4410-8F6F-DAEAA6E8CC01}" dt="2018-11-26T14:59:18.809" v="3661" actId="20577"/>
           <ac:graphicFrameMkLst>
             <pc:docMk/>
             <pc:sldMk cId="0" sldId="256"/>
@@ -6882,8 +6882,8 @@
         </p:nvSpPr>
         <p:spPr bwMode="auto">
           <a:xfrm>
-            <a:off x="10166846" y="3226594"/>
-            <a:ext cx="19829760" cy="7921625"/>
+            <a:off x="10091738" y="3307379"/>
+            <a:ext cx="19815547" cy="7921625"/>
           </a:xfrm>
           <a:prstGeom prst="roundRect">
             <a:avLst>
@@ -6983,8 +6983,8 @@
         </p:nvSpPr>
         <p:spPr bwMode="auto">
           <a:xfrm>
-            <a:off x="21497504" y="16332994"/>
-            <a:ext cx="8409781" cy="4800600"/>
+            <a:off x="21497504" y="16713994"/>
+            <a:ext cx="8409781" cy="4267200"/>
           </a:xfrm>
           <a:prstGeom prst="rect">
             <a:avLst/>
@@ -7033,7 +7033,7 @@
                 <a:latin typeface="Arial" charset="0"/>
                 <a:ea typeface="宋体" pitchFamily="2" charset="-122"/>
               </a:rPr>
-              <a:t>Many components involved in phishing detection</a:t>
+              <a:t>Many components involved in phishing detection.</a:t>
             </a:r>
           </a:p>
           <a:p>
@@ -7049,7 +7049,7 @@
                 <a:latin typeface="Arial" charset="0"/>
                 <a:ea typeface="宋体" pitchFamily="2" charset="-122"/>
               </a:rPr>
-              <a:t>Gather more experimental data on live phishing sites to fine-tune threshold parameters</a:t>
+              <a:t>Gather more experimental data on live phishing sites to fine-tune threshold parameters.</a:t>
             </a:r>
           </a:p>
           <a:p>
@@ -7065,7 +7065,7 @@
                 <a:latin typeface="Arial" charset="0"/>
                 <a:ea typeface="宋体" pitchFamily="2" charset="-122"/>
               </a:rPr>
-              <a:t>Add additional checks for visual components</a:t>
+              <a:t>Add additional checks for visual components.</a:t>
             </a:r>
           </a:p>
           <a:p>
@@ -7081,7 +7081,7 @@
                 <a:latin typeface="Arial" charset="0"/>
                 <a:ea typeface="宋体" pitchFamily="2" charset="-122"/>
               </a:rPr>
-              <a:t>Prompt user to input where they think they are going</a:t>
+              <a:t>Prompt user to input where they think they are going.</a:t>
             </a:r>
           </a:p>
           <a:p>
@@ -7097,27 +7097,14 @@
                 <a:latin typeface="Arial" charset="0"/>
                 <a:ea typeface="宋体" pitchFamily="2" charset="-122"/>
               </a:rPr>
-              <a:t>Devise ways to infer the actual website from the </a:t>
-            </a:r>
-            <a:r>
-              <a:rPr lang="en-AU" altLang="zh-CN" sz="2300" baseline="0">
-                <a:latin typeface="Arial" charset="0"/>
-                <a:ea typeface="宋体" pitchFamily="2" charset="-122"/>
-              </a:rPr>
-              <a:t>page content</a:t>
-            </a:r>
-            <a:endParaRPr lang="en-AU" altLang="zh-CN" sz="2300" baseline="0" dirty="0">
-              <a:latin typeface="Arial" charset="0"/>
-              <a:ea typeface="宋体" pitchFamily="2" charset="-122"/>
-            </a:endParaRPr>
-          </a:p>
-          <a:p>
-            <a:pPr marL="342900" indent="-342900" algn="just" defTabSz="538147">
+              <a:t>Devise ways to infer the actual website from the page content.</a:t>
+            </a:r>
+          </a:p>
+          <a:p>
+            <a:pPr algn="just" defTabSz="538147">
               <a:spcBef>
                 <a:spcPct val="50000"/>
               </a:spcBef>
-              <a:buFont typeface="Arial" panose="020B0604020202020204" pitchFamily="34" charset="0"/>
-              <a:buChar char="•"/>
             </a:pPr>
             <a:endParaRPr lang="en-AU" altLang="zh-CN" sz="2300" baseline="0" dirty="0">
               <a:latin typeface="Arial" charset="0"/>
@@ -7192,7 +7179,67 @@
                 <a:latin typeface="Arial" charset="0"/>
                 <a:ea typeface="宋体" pitchFamily="2" charset="-122"/>
               </a:rPr>
-              <a:t>Group Members</a:t>
+              <a:t>Samantha Wong Shin Nee, Teo Ee Siang Lionel, Leong Peng </a:t>
+            </a:r>
+            <a:r>
+              <a:rPr lang="en-US" altLang="zh-CN" sz="3600" baseline="0" dirty="0" err="1">
+                <a:solidFill>
+                  <a:schemeClr val="bg1"/>
+                </a:solidFill>
+                <a:effectLst>
+                  <a:outerShdw blurRad="38100" dist="38100" dir="2700000" algn="tl">
+                    <a:srgbClr val="000000"/>
+                  </a:outerShdw>
+                </a:effectLst>
+                <a:latin typeface="Arial" charset="0"/>
+                <a:ea typeface="宋体" pitchFamily="2" charset="-122"/>
+              </a:rPr>
+              <a:t>Kuen</a:t>
+            </a:r>
+            <a:r>
+              <a:rPr lang="en-US" altLang="zh-CN" sz="3600" baseline="0" dirty="0">
+                <a:solidFill>
+                  <a:schemeClr val="bg1"/>
+                </a:solidFill>
+                <a:effectLst>
+                  <a:outerShdw blurRad="38100" dist="38100" dir="2700000" algn="tl">
+                    <a:srgbClr val="000000"/>
+                  </a:outerShdw>
+                </a:effectLst>
+                <a:latin typeface="Arial" charset="0"/>
+                <a:ea typeface="宋体" pitchFamily="2" charset="-122"/>
+              </a:rPr>
+              <a:t>, Quek </a:t>
+            </a:r>
+            <a:r>
+              <a:rPr lang="en-US" altLang="zh-CN" sz="3600" baseline="0" dirty="0" err="1">
+                <a:solidFill>
+                  <a:schemeClr val="bg1"/>
+                </a:solidFill>
+                <a:effectLst>
+                  <a:outerShdw blurRad="38100" dist="38100" dir="2700000" algn="tl">
+                    <a:srgbClr val="000000"/>
+                  </a:outerShdw>
+                </a:effectLst>
+                <a:latin typeface="Arial" charset="0"/>
+                <a:ea typeface="宋体" pitchFamily="2" charset="-122"/>
+              </a:rPr>
+              <a:t>Zhi</a:t>
+            </a:r>
+            <a:r>
+              <a:rPr lang="en-US" altLang="zh-CN" sz="3600" baseline="0" dirty="0">
+                <a:solidFill>
+                  <a:schemeClr val="bg1"/>
+                </a:solidFill>
+                <a:effectLst>
+                  <a:outerShdw blurRad="38100" dist="38100" dir="2700000" algn="tl">
+                    <a:srgbClr val="000000"/>
+                  </a:outerShdw>
+                </a:effectLst>
+                <a:latin typeface="Arial" charset="0"/>
+                <a:ea typeface="宋体" pitchFamily="2" charset="-122"/>
+              </a:rPr>
+              <a:t> Qin Daryl</a:t>
             </a:r>
           </a:p>
           <a:p>
@@ -7232,8 +7279,8 @@
         </p:nvSpPr>
         <p:spPr bwMode="auto">
           <a:xfrm>
-            <a:off x="354806" y="8331994"/>
-            <a:ext cx="9566126" cy="3581400"/>
+            <a:off x="313680" y="8331994"/>
+            <a:ext cx="9566126" cy="3124200"/>
           </a:xfrm>
           <a:prstGeom prst="rect">
             <a:avLst/>
@@ -7469,8 +7516,8 @@
         </p:nvSpPr>
         <p:spPr bwMode="auto">
           <a:xfrm>
-            <a:off x="21497505" y="11456194"/>
-            <a:ext cx="8409781" cy="4724400"/>
+            <a:off x="21497503" y="11608594"/>
+            <a:ext cx="8409781" cy="4852821"/>
           </a:xfrm>
           <a:prstGeom prst="rect">
             <a:avLst/>
@@ -7576,7 +7623,7 @@
                 <a:latin typeface="Arial" charset="0"/>
                 <a:ea typeface="宋体" pitchFamily="2" charset="-122"/>
               </a:rPr>
-              <a:t>May have limited text available on actual page with the clear use of images</a:t>
+              <a:t>May have limited text available on actual page with the clear use of images.</a:t>
             </a:r>
           </a:p>
           <a:p>
@@ -7595,7 +7642,7 @@
                 <a:latin typeface="Arial" charset="0"/>
                 <a:ea typeface="宋体" pitchFamily="2" charset="-122"/>
               </a:rPr>
-              <a:t>Site statistics such as URL traffic hits might change if it is a very viral phish</a:t>
+              <a:t>Site statistics such as URL traffic hits might change if it is a very viral phish.</a:t>
             </a:r>
           </a:p>
         </p:txBody>
@@ -7610,7 +7657,7 @@
         </p:nvSpPr>
         <p:spPr bwMode="auto">
           <a:xfrm>
-            <a:off x="10459666" y="3416201"/>
+            <a:off x="10600901" y="3524643"/>
             <a:ext cx="8545090" cy="706965"/>
           </a:xfrm>
           <a:prstGeom prst="rect">
@@ -7780,7 +7827,7 @@
                 <a:latin typeface="Arial" charset="0"/>
                 <a:ea typeface="宋体" pitchFamily="2" charset="-122"/>
               </a:rPr>
-              <a:t>A Google search is conducted for the target URL’s page title. If URL of the top search result matches, this is considered to be a legitimate web page. Otherwise, it is put through the phishing detection engine.</a:t>
+              <a:t>A Google search is conducted for the target URL’s page title. If URL of the top search result matches, this is considered to be a legitimate web page. Otherwise, it is put through the phishing detection engine with the possible identified original site.</a:t>
             </a:r>
           </a:p>
           <a:p>
@@ -7903,7 +7950,7 @@
                 <a:latin typeface="Arial" charset="0"/>
                 <a:ea typeface="宋体" pitchFamily="2" charset="-122"/>
               </a:rPr>
-              <a:t>Page statistics are examined for the target URL.</a:t>
+              <a:t>Site statistics are examined for the target URL and possible identified original site. Compare both websites for page ranking and traffic hits.</a:t>
             </a:r>
           </a:p>
           <a:p>
@@ -8087,7 +8134,7 @@
         <p:spPr bwMode="auto">
           <a:xfrm>
             <a:off x="315367" y="3317179"/>
-            <a:ext cx="9566126" cy="4786215"/>
+            <a:ext cx="9564439" cy="4786215"/>
           </a:xfrm>
           <a:prstGeom prst="rect">
             <a:avLst/>
@@ -8276,8 +8323,8 @@
         </p:nvSpPr>
         <p:spPr bwMode="auto">
           <a:xfrm>
-            <a:off x="313680" y="12141994"/>
-            <a:ext cx="9566126" cy="8991599"/>
+            <a:off x="313680" y="11608594"/>
+            <a:ext cx="9566126" cy="9372601"/>
           </a:xfrm>
           <a:prstGeom prst="rect">
             <a:avLst/>
@@ -8358,7 +8405,7 @@
                 <a:latin typeface="Arial" charset="0"/>
                 <a:ea typeface="宋体" pitchFamily="2" charset="-122"/>
               </a:rPr>
-              <a:t>Domain Content</a:t>
+              <a:t>Domain Content.</a:t>
             </a:r>
           </a:p>
           <a:p>
@@ -8377,7 +8424,7 @@
                 <a:latin typeface="Arial" charset="0"/>
                 <a:ea typeface="宋体" pitchFamily="2" charset="-122"/>
               </a:rPr>
-              <a:t>Domain Length</a:t>
+              <a:t>Domain Length.</a:t>
             </a:r>
           </a:p>
           <a:p>
@@ -8425,7 +8472,7 @@
                 <a:latin typeface="Arial" charset="0"/>
                 <a:ea typeface="宋体" pitchFamily="2" charset="-122"/>
               </a:rPr>
-              <a:t>Domain Age: ~96% of phishing sites are taken down within 1 month</a:t>
+              <a:t>Domain Age: ~96% of phishing sites are taken down within 1 month.</a:t>
             </a:r>
           </a:p>
           <a:p>
@@ -8511,7 +8558,7 @@
                 <a:latin typeface="Arial" charset="0"/>
                 <a:ea typeface="宋体" pitchFamily="2" charset="-122"/>
               </a:rPr>
-              <a:t>Page Ranking</a:t>
+              <a:t>Page Ranking.</a:t>
             </a:r>
           </a:p>
           <a:p>
@@ -8530,7 +8577,7 @@
                 <a:latin typeface="Arial" charset="0"/>
                 <a:ea typeface="宋体" pitchFamily="2" charset="-122"/>
               </a:rPr>
-              <a:t>Traffic Hits </a:t>
+              <a:t>Traffic Hits. </a:t>
             </a:r>
           </a:p>
           <a:p>
@@ -9508,7 +9555,7 @@
         </p:nvSpPr>
         <p:spPr bwMode="auto">
           <a:xfrm>
-            <a:off x="19612292" y="3317179"/>
+            <a:off x="19612292" y="3524642"/>
             <a:ext cx="9469914" cy="706965"/>
           </a:xfrm>
           <a:prstGeom prst="rect">

</xml_diff>

<commit_message>
Added error handling in domain check
Also set checkGlobal default to false.
</commit_message>
<xml_diff>
--- a/CS5331_Poster.pptx
+++ b/CS5331_Poster.pptx
@@ -158,6 +158,30 @@
 
 <file path=ppt/changesInfos/changesInfo1.xml><?xml version="1.0" encoding="utf-8"?>
 <pc:chgInfo xmlns:a="http://schemas.openxmlformats.org/drawingml/2006/main" xmlns:r="http://schemas.openxmlformats.org/officeDocument/2006/relationships" xmlns:ac="http://schemas.microsoft.com/office/drawing/2013/main/command" xmlns:pc="http://schemas.microsoft.com/office/powerpoint/2013/main/command">
+  <pc:docChgLst>
+    <pc:chgData name="Daryl Quek" userId="f27e3362e4192b30" providerId="LiveId" clId="{3839A65F-C345-44E2-9A2D-85CBB1B22877}"/>
+    <pc:docChg chg="modSld">
+      <pc:chgData name="Daryl Quek" userId="f27e3362e4192b30" providerId="LiveId" clId="{3839A65F-C345-44E2-9A2D-85CBB1B22877}" dt="2018-11-27T00:42:12.831" v="1" actId="20577"/>
+      <pc:docMkLst>
+        <pc:docMk/>
+      </pc:docMkLst>
+      <pc:sldChg chg="modSp">
+        <pc:chgData name="Daryl Quek" userId="f27e3362e4192b30" providerId="LiveId" clId="{3839A65F-C345-44E2-9A2D-85CBB1B22877}" dt="2018-11-27T00:42:12.831" v="1" actId="20577"/>
+        <pc:sldMkLst>
+          <pc:docMk/>
+          <pc:sldMk cId="0" sldId="256"/>
+        </pc:sldMkLst>
+        <pc:graphicFrameChg chg="modGraphic">
+          <ac:chgData name="Daryl Quek" userId="f27e3362e4192b30" providerId="LiveId" clId="{3839A65F-C345-44E2-9A2D-85CBB1B22877}" dt="2018-11-27T00:42:12.831" v="1" actId="20577"/>
+          <ac:graphicFrameMkLst>
+            <pc:docMk/>
+            <pc:sldMk cId="0" sldId="256"/>
+            <ac:graphicFrameMk id="3" creationId="{E2BDA739-5B11-4071-938B-12C5D55E1CD5}"/>
+          </ac:graphicFrameMkLst>
+        </pc:graphicFrameChg>
+      </pc:sldChg>
+    </pc:docChg>
+  </pc:docChgLst>
   <pc:docChgLst>
     <pc:chgData name="Daryl Quek" userId="f27e3362e4192b30" providerId="LiveId" clId="{EABF0CBF-A883-4410-8F6F-DAEAA6E8CC01}"/>
     <pc:docChg chg="undo redo custSel modSld">
@@ -8712,7 +8736,7 @@
           <p:nvPr>
             <p:extLst>
               <p:ext uri="{D42A27DB-BD31-4B8C-83A1-F6EECF244321}">
-                <p14:modId xmlns:p14="http://schemas.microsoft.com/office/powerpoint/2010/main" val="3973783911"/>
+                <p14:modId xmlns:p14="http://schemas.microsoft.com/office/powerpoint/2010/main" val="4278524007"/>
               </p:ext>
             </p:extLst>
           </p:nvPr>
@@ -9073,7 +9097,15 @@
                     <a:p>
                       <a:r>
                         <a:rPr lang="en-SG" sz="2000" dirty="0"/>
-                        <a:t>&lt; 3 months</a:t>
+                        <a:t>&gt;</a:t>
+                      </a:r>
+                      <a:r>
+                        <a:rPr lang="en-SG" sz="2000"/>
+                        <a:t> </a:t>
+                      </a:r>
+                      <a:r>
+                        <a:rPr lang="en-SG" sz="2000" dirty="0"/>
+                        <a:t>3 months</a:t>
                       </a:r>
                     </a:p>
                   </a:txBody>

</xml_diff>